<commit_message>
Changed use case and architecture
</commit_message>
<xml_diff>
--- a/3architecture/Architecture.pptx
+++ b/3architecture/Architecture.pptx
@@ -198,7 +198,7 @@
           <a:p>
             <a:fld id="{28BDC9D7-E9CB-40B4-A15E-AA970C358381}" type="datetimeFigureOut">
               <a:rPr lang="en-US" smtClean="0"/>
-              <a:t>4/22/2016</a:t>
+              <a:t>4/27/2016</a:t>
             </a:fld>
             <a:endParaRPr lang="en-US"/>
           </a:p>
@@ -1295,7 +1295,7 @@
           <a:p>
             <a:fld id="{A7A44A2C-D3DA-463E-847C-1BD2FBBDC97F}" type="datetimeFigureOut">
               <a:rPr lang="en-US" smtClean="0"/>
-              <a:t>4/22/2016</a:t>
+              <a:t>4/27/2016</a:t>
             </a:fld>
             <a:endParaRPr lang="en-US"/>
           </a:p>
@@ -1546,7 +1546,7 @@
           <a:p>
             <a:fld id="{A7A44A2C-D3DA-463E-847C-1BD2FBBDC97F}" type="datetimeFigureOut">
               <a:rPr lang="en-US" smtClean="0"/>
-              <a:t>4/22/2016</a:t>
+              <a:t>4/27/2016</a:t>
             </a:fld>
             <a:endParaRPr lang="en-US"/>
           </a:p>
@@ -1860,7 +1860,7 @@
           <a:p>
             <a:fld id="{A7A44A2C-D3DA-463E-847C-1BD2FBBDC97F}" type="datetimeFigureOut">
               <a:rPr lang="en-US" smtClean="0"/>
-              <a:t>4/22/2016</a:t>
+              <a:t>4/27/2016</a:t>
             </a:fld>
             <a:endParaRPr lang="en-US"/>
           </a:p>
@@ -2193,7 +2193,7 @@
           <a:p>
             <a:fld id="{A7A44A2C-D3DA-463E-847C-1BD2FBBDC97F}" type="datetimeFigureOut">
               <a:rPr lang="en-US" smtClean="0"/>
-              <a:t>4/22/2016</a:t>
+              <a:t>4/27/2016</a:t>
             </a:fld>
             <a:endParaRPr lang="en-US"/>
           </a:p>
@@ -2507,7 +2507,7 @@
           <a:p>
             <a:fld id="{A7A44A2C-D3DA-463E-847C-1BD2FBBDC97F}" type="datetimeFigureOut">
               <a:rPr lang="en-US" smtClean="0"/>
-              <a:t>4/22/2016</a:t>
+              <a:t>4/27/2016</a:t>
             </a:fld>
             <a:endParaRPr lang="en-US"/>
           </a:p>
@@ -2900,7 +2900,7 @@
           <a:p>
             <a:fld id="{A7A44A2C-D3DA-463E-847C-1BD2FBBDC97F}" type="datetimeFigureOut">
               <a:rPr lang="en-US" smtClean="0"/>
-              <a:t>4/22/2016</a:t>
+              <a:t>4/27/2016</a:t>
             </a:fld>
             <a:endParaRPr lang="en-US"/>
           </a:p>
@@ -3070,7 +3070,7 @@
           <a:p>
             <a:fld id="{A7A44A2C-D3DA-463E-847C-1BD2FBBDC97F}" type="datetimeFigureOut">
               <a:rPr lang="en-US" smtClean="0"/>
-              <a:t>4/22/2016</a:t>
+              <a:t>4/27/2016</a:t>
             </a:fld>
             <a:endParaRPr lang="en-US"/>
           </a:p>
@@ -3250,7 +3250,7 @@
           <a:p>
             <a:fld id="{A7A44A2C-D3DA-463E-847C-1BD2FBBDC97F}" type="datetimeFigureOut">
               <a:rPr lang="en-US" smtClean="0"/>
-              <a:t>4/22/2016</a:t>
+              <a:t>4/27/2016</a:t>
             </a:fld>
             <a:endParaRPr lang="en-US"/>
           </a:p>
@@ -3420,7 +3420,7 @@
           <a:p>
             <a:fld id="{A7A44A2C-D3DA-463E-847C-1BD2FBBDC97F}" type="datetimeFigureOut">
               <a:rPr lang="en-US" smtClean="0"/>
-              <a:t>4/22/2016</a:t>
+              <a:t>4/27/2016</a:t>
             </a:fld>
             <a:endParaRPr lang="en-US"/>
           </a:p>
@@ -3667,7 +3667,7 @@
           <a:p>
             <a:fld id="{A7A44A2C-D3DA-463E-847C-1BD2FBBDC97F}" type="datetimeFigureOut">
               <a:rPr lang="en-US" smtClean="0"/>
-              <a:t>4/22/2016</a:t>
+              <a:t>4/27/2016</a:t>
             </a:fld>
             <a:endParaRPr lang="en-US"/>
           </a:p>
@@ -3899,7 +3899,7 @@
           <a:p>
             <a:fld id="{A7A44A2C-D3DA-463E-847C-1BD2FBBDC97F}" type="datetimeFigureOut">
               <a:rPr lang="en-US" smtClean="0"/>
-              <a:t>4/22/2016</a:t>
+              <a:t>4/27/2016</a:t>
             </a:fld>
             <a:endParaRPr lang="en-US"/>
           </a:p>
@@ -4273,7 +4273,7 @@
           <a:p>
             <a:fld id="{A7A44A2C-D3DA-463E-847C-1BD2FBBDC97F}" type="datetimeFigureOut">
               <a:rPr lang="en-US" smtClean="0"/>
-              <a:t>4/22/2016</a:t>
+              <a:t>4/27/2016</a:t>
             </a:fld>
             <a:endParaRPr lang="en-US"/>
           </a:p>
@@ -4396,7 +4396,7 @@
           <a:p>
             <a:fld id="{A7A44A2C-D3DA-463E-847C-1BD2FBBDC97F}" type="datetimeFigureOut">
               <a:rPr lang="en-US" smtClean="0"/>
-              <a:t>4/22/2016</a:t>
+              <a:t>4/27/2016</a:t>
             </a:fld>
             <a:endParaRPr lang="en-US"/>
           </a:p>
@@ -4491,7 +4491,7 @@
           <a:p>
             <a:fld id="{A7A44A2C-D3DA-463E-847C-1BD2FBBDC97F}" type="datetimeFigureOut">
               <a:rPr lang="en-US" smtClean="0"/>
-              <a:t>4/22/2016</a:t>
+              <a:t>4/27/2016</a:t>
             </a:fld>
             <a:endParaRPr lang="en-US"/>
           </a:p>
@@ -4746,7 +4746,7 @@
           <a:p>
             <a:fld id="{A7A44A2C-D3DA-463E-847C-1BD2FBBDC97F}" type="datetimeFigureOut">
               <a:rPr lang="en-US" smtClean="0"/>
-              <a:t>4/22/2016</a:t>
+              <a:t>4/27/2016</a:t>
             </a:fld>
             <a:endParaRPr lang="en-US"/>
           </a:p>
@@ -5051,7 +5051,7 @@
           <a:p>
             <a:fld id="{A7A44A2C-D3DA-463E-847C-1BD2FBBDC97F}" type="datetimeFigureOut">
               <a:rPr lang="en-US" smtClean="0"/>
-              <a:t>4/22/2016</a:t>
+              <a:t>4/27/2016</a:t>
             </a:fld>
             <a:endParaRPr lang="en-US"/>
           </a:p>
@@ -5753,7 +5753,7 @@
           <a:p>
             <a:fld id="{A7A44A2C-D3DA-463E-847C-1BD2FBBDC97F}" type="datetimeFigureOut">
               <a:rPr lang="en-US" smtClean="0"/>
-              <a:t>4/22/2016</a:t>
+              <a:t>4/27/2016</a:t>
             </a:fld>
             <a:endParaRPr lang="en-US"/>
           </a:p>
@@ -6295,14 +6295,27 @@
         </p:spPr>
         <p:txBody>
           <a:bodyPr>
-            <a:normAutofit/>
+            <a:normAutofit fontScale="90000"/>
           </a:bodyPr>
           <a:lstStyle/>
           <a:p>
             <a:r>
+              <a:rPr lang="en-US" dirty="0" smtClean="0"/>
+              <a:t>Web-based tool to </a:t>
+            </a:r>
+            <a:r>
+              <a:rPr lang="en-US" dirty="0" err="1" smtClean="0"/>
+              <a:t>semantify</a:t>
+            </a:r>
+            <a:r>
               <a:rPr lang="en-US" dirty="0"/>
-              <a:t>Vocabulary based-integration Web tool for Industry 4.0 Standards</a:t>
-            </a:r>
+              <a:t> </a:t>
+            </a:r>
+            <a:r>
+              <a:rPr lang="en-US" dirty="0" smtClean="0"/>
+              <a:t>the knowledge of a standards with semantic technologies</a:t>
+            </a:r>
+            <a:endParaRPr lang="en-US" dirty="0"/>
           </a:p>
         </p:txBody>
       </p:sp>
@@ -6629,35 +6642,6 @@
       </p:pic>
       <p:pic>
         <p:nvPicPr>
-          <p:cNvPr id="6" name="Объект 5"/>
-          <p:cNvPicPr>
-            <a:picLocks noGrp="1" noChangeAspect="1"/>
-          </p:cNvPicPr>
-          <p:nvPr>
-            <p:ph idx="1"/>
-          </p:nvPr>
-        </p:nvPicPr>
-        <p:blipFill>
-          <a:blip r:embed="rId7">
-            <a:extLst>
-              <a:ext uri="{28A0092B-C50C-407E-A947-70E740481C1C}">
-                <a14:useLocalDpi xmlns:a14="http://schemas.microsoft.com/office/drawing/2010/main" val="0"/>
-              </a:ext>
-            </a:extLst>
-          </a:blip>
-          <a:stretch>
-            <a:fillRect/>
-          </a:stretch>
-        </p:blipFill>
-        <p:spPr>
-          <a:xfrm>
-            <a:off x="1484312" y="727573"/>
-            <a:ext cx="7345788" cy="4468812"/>
-          </a:xfrm>
-        </p:spPr>
-      </p:pic>
-      <p:pic>
-        <p:nvPicPr>
           <p:cNvPr id="7" name="Picture 2" descr="http://www.epimorphics.com/web/sites/all/documents/jena-logo-large.png"/>
           <p:cNvPicPr>
             <a:picLocks noChangeAspect="1" noChangeArrowheads="1"/>
@@ -6665,7 +6649,7 @@
           <p:nvPr/>
         </p:nvPicPr>
         <p:blipFill>
-          <a:blip r:embed="rId8">
+          <a:blip r:embed="rId7">
             <a:extLst>
               <a:ext uri="{28A0092B-C50C-407E-A947-70E740481C1C}">
                 <a14:useLocalDpi xmlns:a14="http://schemas.microsoft.com/office/drawing/2010/main" val="0"/>
@@ -6695,6 +6679,35 @@
               </a14:hiddenFill>
             </a:ext>
           </a:extLst>
+        </p:spPr>
+      </p:pic>
+      <p:pic>
+        <p:nvPicPr>
+          <p:cNvPr id="4" name="Объект 3"/>
+          <p:cNvPicPr>
+            <a:picLocks noGrp="1" noChangeAspect="1"/>
+          </p:cNvPicPr>
+          <p:nvPr>
+            <p:ph idx="1"/>
+          </p:nvPr>
+        </p:nvPicPr>
+        <p:blipFill>
+          <a:blip r:embed="rId8">
+            <a:extLst>
+              <a:ext uri="{28A0092B-C50C-407E-A947-70E740481C1C}">
+                <a14:useLocalDpi xmlns:a14="http://schemas.microsoft.com/office/drawing/2010/main" val="0"/>
+              </a:ext>
+            </a:extLst>
+          </a:blip>
+          <a:stretch>
+            <a:fillRect/>
+          </a:stretch>
+        </p:blipFill>
+        <p:spPr>
+          <a:xfrm>
+            <a:off x="1247274" y="755389"/>
+            <a:ext cx="7787544" cy="4440996"/>
+          </a:xfrm>
         </p:spPr>
       </p:pic>
     </p:spTree>

</xml_diff>